<commit_message>
Added contents for Lesson 2
</commit_message>
<xml_diff>
--- a/nihongo/02-20171008.pptx
+++ b/nihongo/02-20171008.pptx
@@ -6,24 +6,25 @@
   </p:sldMasterIdLst>
   <p:sldIdLst>
     <p:sldId id="256" r:id="rId2"/>
-    <p:sldId id="257" r:id="rId3"/>
-    <p:sldId id="258" r:id="rId4"/>
-    <p:sldId id="260" r:id="rId5"/>
-    <p:sldId id="259" r:id="rId6"/>
-    <p:sldId id="268" r:id="rId7"/>
-    <p:sldId id="261" r:id="rId8"/>
-    <p:sldId id="271" r:id="rId9"/>
-    <p:sldId id="270" r:id="rId10"/>
-    <p:sldId id="264" r:id="rId11"/>
-    <p:sldId id="272" r:id="rId12"/>
-    <p:sldId id="265" r:id="rId13"/>
-    <p:sldId id="273" r:id="rId14"/>
-    <p:sldId id="262" r:id="rId15"/>
-    <p:sldId id="266" r:id="rId16"/>
-    <p:sldId id="267" r:id="rId17"/>
-    <p:sldId id="274" r:id="rId18"/>
-    <p:sldId id="269" r:id="rId19"/>
-    <p:sldId id="263" r:id="rId20"/>
+    <p:sldId id="275" r:id="rId3"/>
+    <p:sldId id="257" r:id="rId4"/>
+    <p:sldId id="258" r:id="rId5"/>
+    <p:sldId id="260" r:id="rId6"/>
+    <p:sldId id="259" r:id="rId7"/>
+    <p:sldId id="268" r:id="rId8"/>
+    <p:sldId id="261" r:id="rId9"/>
+    <p:sldId id="271" r:id="rId10"/>
+    <p:sldId id="270" r:id="rId11"/>
+    <p:sldId id="264" r:id="rId12"/>
+    <p:sldId id="272" r:id="rId13"/>
+    <p:sldId id="265" r:id="rId14"/>
+    <p:sldId id="273" r:id="rId15"/>
+    <p:sldId id="262" r:id="rId16"/>
+    <p:sldId id="266" r:id="rId17"/>
+    <p:sldId id="267" r:id="rId18"/>
+    <p:sldId id="274" r:id="rId19"/>
+    <p:sldId id="269" r:id="rId20"/>
+    <p:sldId id="263" r:id="rId21"/>
   </p:sldIdLst>
   <p:sldSz cx="12192000" cy="6858000"/>
   <p:notesSz cx="6858000" cy="9144000"/>
@@ -7735,7 +7736,7 @@
           <a:p>
             <a:r>
               <a:rPr kumimoji="1" lang="ja-JP" altLang="en-US" dirty="0" smtClean="0"/>
-              <a:t>の</a:t>
+              <a:t>で</a:t>
             </a:r>
             <a:r>
               <a:rPr kumimoji="1" lang="en-US" altLang="ja-JP" dirty="0" smtClean="0"/>
@@ -7746,7 +7747,7 @@
             </a:br>
             <a:r>
               <a:rPr kumimoji="1" lang="zh-CN" altLang="en-US" dirty="0" smtClean="0"/>
-              <a:t>用于名词之间的修饰</a:t>
+              <a:t>表示顺接（有时带因果关系）</a:t>
             </a:r>
             <a:endParaRPr kumimoji="1" lang="zh-CN" altLang="en-US" dirty="0"/>
           </a:p>
@@ -7769,16 +7770,30 @@
           <a:p>
             <a:r>
               <a:rPr kumimoji="1" lang="ja-JP" altLang="en-US" dirty="0" smtClean="0"/>
-              <a:t>この男の名前はクラウディウス・サンクトペテルブルグです。彼は運命の人です。</a:t>
+              <a:t>スライムがヌルヌルでなんだかエロい気分です。</a:t>
+            </a:r>
+            <a:endParaRPr kumimoji="1" lang="en-US" altLang="ja-JP" dirty="0"/>
+          </a:p>
+          <a:p>
+            <a:r>
+              <a:rPr kumimoji="1" lang="ja-JP" altLang="en-US" dirty="0" smtClean="0"/>
+              <a:t>リンクは綺麗で、女装してもバレません。</a:t>
             </a:r>
             <a:endParaRPr kumimoji="1" lang="en-US" altLang="ja-JP" dirty="0" smtClean="0"/>
+          </a:p>
+          <a:p>
+            <a:r>
+              <a:rPr kumimoji="1" lang="ja-JP" altLang="en-US" dirty="0" smtClean="0"/>
+              <a:t>それで、あるイケメン男子に惚れました。</a:t>
+            </a:r>
+            <a:endParaRPr kumimoji="1" lang="zh-CN" altLang="en-US" dirty="0"/>
           </a:p>
         </p:txBody>
       </p:sp>
     </p:spTree>
     <p:extLst>
       <p:ext uri="{BB962C8B-B14F-4D97-AF65-F5344CB8AC3E}">
-        <p14:creationId xmlns:p14="http://schemas.microsoft.com/office/powerpoint/2010/main" val="1372388733"/>
+        <p14:creationId xmlns:p14="http://schemas.microsoft.com/office/powerpoint/2010/main" val="22365501"/>
       </p:ext>
     </p:extLst>
   </p:cSld>
@@ -7833,7 +7848,7 @@
             </a:br>
             <a:r>
               <a:rPr kumimoji="1" lang="zh-CN" altLang="en-US" dirty="0" smtClean="0"/>
-              <a:t>解释原因</a:t>
+              <a:t>用于名词之间的修饰</a:t>
             </a:r>
             <a:endParaRPr kumimoji="1" lang="zh-CN" altLang="en-US" dirty="0"/>
           </a:p>
@@ -7855,21 +7870,17 @@
           <a:lstStyle/>
           <a:p>
             <a:r>
-              <a:rPr kumimoji="1" lang="ja-JP" altLang="en-US" dirty="0"/>
-              <a:t>なぜなら、わたくしはイケメンが大好きなのです</a:t>
-            </a:r>
-            <a:r>
               <a:rPr kumimoji="1" lang="ja-JP" altLang="en-US" dirty="0" smtClean="0"/>
-              <a:t>。</a:t>
-            </a:r>
-            <a:endParaRPr kumimoji="1" lang="en-US" altLang="ja-JP" dirty="0"/>
+              <a:t>この男の名前はクラウディウス・サンクトペテルブルグです。彼は運命の人です。</a:t>
+            </a:r>
+            <a:endParaRPr kumimoji="1" lang="en-US" altLang="ja-JP" dirty="0" smtClean="0"/>
           </a:p>
         </p:txBody>
       </p:sp>
     </p:spTree>
     <p:extLst>
       <p:ext uri="{BB962C8B-B14F-4D97-AF65-F5344CB8AC3E}">
-        <p14:creationId xmlns:p14="http://schemas.microsoft.com/office/powerpoint/2010/main" val="2004435372"/>
+        <p14:creationId xmlns:p14="http://schemas.microsoft.com/office/powerpoint/2010/main" val="1372388733"/>
       </p:ext>
     </p:extLst>
   </p:cSld>
@@ -7913,7 +7924,7 @@
           <a:p>
             <a:r>
               <a:rPr kumimoji="1" lang="ja-JP" altLang="en-US" dirty="0" smtClean="0"/>
-              <a:t>と</a:t>
+              <a:t>の</a:t>
             </a:r>
             <a:r>
               <a:rPr kumimoji="1" lang="en-US" altLang="ja-JP" dirty="0" smtClean="0"/>
@@ -7924,7 +7935,7 @@
             </a:br>
             <a:r>
               <a:rPr kumimoji="1" lang="zh-CN" altLang="en-US" dirty="0" smtClean="0"/>
-              <a:t>表示对等地位的动作对象。“与”</a:t>
+              <a:t>解释原因</a:t>
             </a:r>
             <a:endParaRPr kumimoji="1" lang="zh-CN" altLang="en-US" dirty="0"/>
           </a:p>
@@ -7946,34 +7957,21 @@
           <a:lstStyle/>
           <a:p>
             <a:r>
+              <a:rPr kumimoji="1" lang="ja-JP" altLang="en-US" dirty="0"/>
+              <a:t>なぜなら、わたくしはイケメンが大好きなのです</a:t>
+            </a:r>
+            <a:r>
               <a:rPr kumimoji="1" lang="ja-JP" altLang="en-US" dirty="0" smtClean="0"/>
-              <a:t>みんなと話します。</a:t>
-            </a:r>
-            <a:endParaRPr kumimoji="1" lang="en-US" altLang="ja-JP" dirty="0" smtClean="0"/>
-          </a:p>
-          <a:p>
-            <a:r>
-              <a:rPr kumimoji="1" lang="ja-JP" altLang="en-US" dirty="0" smtClean="0"/>
-              <a:t>兄様なんかもう要りません、わたくしはこの男と結婚したいです。</a:t>
-            </a:r>
-            <a:endParaRPr kumimoji="1" lang="en-US" altLang="ja-JP" dirty="0" smtClean="0"/>
-          </a:p>
-          <a:p>
-            <a:r>
-              <a:rPr kumimoji="1" lang="ja-JP" altLang="en-US" dirty="0" smtClean="0"/>
-              <a:t>この男と結婚しないと、明日絶対死んでしまいます。既に死にましたけど。</a:t>
-            </a:r>
-            <a:endParaRPr kumimoji="1" lang="en-US" altLang="ja-JP" dirty="0" smtClean="0"/>
-          </a:p>
-          <a:p>
-            <a:endParaRPr kumimoji="1" lang="zh-CN" altLang="en-US" dirty="0"/>
+              <a:t>。</a:t>
+            </a:r>
+            <a:endParaRPr kumimoji="1" lang="en-US" altLang="ja-JP" dirty="0"/>
           </a:p>
         </p:txBody>
       </p:sp>
     </p:spTree>
     <p:extLst>
       <p:ext uri="{BB962C8B-B14F-4D97-AF65-F5344CB8AC3E}">
-        <p14:creationId xmlns:p14="http://schemas.microsoft.com/office/powerpoint/2010/main" val="492151810"/>
+        <p14:creationId xmlns:p14="http://schemas.microsoft.com/office/powerpoint/2010/main" val="2004435372"/>
       </p:ext>
     </p:extLst>
   </p:cSld>
@@ -8016,19 +8014,19 @@
           <a:lstStyle/>
           <a:p>
             <a:r>
-              <a:rPr kumimoji="1" lang="ja-JP" altLang="en-US" dirty="0"/>
+              <a:rPr kumimoji="1" lang="ja-JP" altLang="en-US" dirty="0" smtClean="0"/>
               <a:t>と</a:t>
             </a:r>
             <a:r>
-              <a:rPr kumimoji="1" lang="en-US" altLang="ja-JP" dirty="0"/>
+              <a:rPr kumimoji="1" lang="en-US" altLang="ja-JP" dirty="0" smtClean="0"/>
               <a:t/>
             </a:r>
             <a:br>
-              <a:rPr kumimoji="1" lang="en-US" altLang="ja-JP" dirty="0"/>
+              <a:rPr kumimoji="1" lang="en-US" altLang="ja-JP" dirty="0" smtClean="0"/>
             </a:br>
             <a:r>
               <a:rPr kumimoji="1" lang="zh-CN" altLang="en-US" dirty="0" smtClean="0"/>
-              <a:t>表示引用</a:t>
+              <a:t>表示对等地位的动作对象。“与”</a:t>
             </a:r>
             <a:endParaRPr kumimoji="1" lang="zh-CN" altLang="en-US" dirty="0"/>
           </a:p>
@@ -8050,115 +8048,34 @@
           <a:lstStyle/>
           <a:p>
             <a:r>
-              <a:rPr kumimoji="1" lang="ja-JP" altLang="en-US" dirty="0" smtClean="0">
-                <a:latin typeface="+mn-ea"/>
-              </a:rPr>
-              <a:t>これはいいと思います。</a:t>
-            </a:r>
-            <a:endParaRPr kumimoji="1" lang="en-US" altLang="ja-JP" dirty="0" smtClean="0">
-              <a:latin typeface="+mn-ea"/>
-            </a:endParaRPr>
-          </a:p>
-          <a:p>
-            <a:r>
-              <a:rPr kumimoji="1" lang="ja-JP" altLang="en-US" dirty="0" smtClean="0">
-                <a:latin typeface="+mn-ea"/>
-              </a:rPr>
-              <a:t>いくらこのアクルカを被ったって、ハクはオシュトルになれないと、クオンはそう</a:t>
-            </a:r>
-            <a:r>
-              <a:rPr kumimoji="1" lang="ja-JP" altLang="en-US" smtClean="0">
-                <a:latin typeface="+mn-ea"/>
-              </a:rPr>
-              <a:t>思っているのだろう。</a:t>
-            </a:r>
-            <a:endParaRPr kumimoji="1" lang="en-US" altLang="ja-JP" dirty="0" smtClean="0">
-              <a:latin typeface="+mn-ea"/>
-            </a:endParaRPr>
-          </a:p>
-          <a:p>
-            <a:r>
-              <a:rPr lang="ja-JP" altLang="en-US" dirty="0" smtClean="0">
-                <a:latin typeface="Meiryo" charset="-128"/>
-                <a:ea typeface="Meiryo" charset="-128"/>
-                <a:cs typeface="Meiryo" charset="-128"/>
-              </a:rPr>
-              <a:t>これは</a:t>
-            </a:r>
-            <a:r>
-              <a:rPr lang="en-US" altLang="zh-CN" dirty="0" smtClean="0">
-                <a:latin typeface="Meiryo" charset="-128"/>
-                <a:ea typeface="Meiryo" charset="-128"/>
-                <a:cs typeface="Meiryo" charset="-128"/>
-              </a:rPr>
-              <a:t>『</a:t>
-            </a:r>
-            <a:r>
-              <a:rPr lang="zh-CN" altLang="en-US" dirty="0">
-                <a:latin typeface="Meiryo" charset="-128"/>
-                <a:ea typeface="Meiryo" charset="-128"/>
-                <a:cs typeface="Meiryo" charset="-128"/>
-              </a:rPr>
-              <a:t>世界最後</a:t>
-            </a:r>
-            <a:r>
-              <a:rPr lang="en-US" altLang="zh-CN" dirty="0">
-                <a:latin typeface="Meiryo" charset="-128"/>
-                <a:ea typeface="Meiryo" charset="-128"/>
-                <a:cs typeface="Meiryo" charset="-128"/>
-              </a:rPr>
-              <a:t>』</a:t>
-            </a:r>
-            <a:r>
-              <a:rPr lang="zh-CN" altLang="en-US" dirty="0">
-                <a:latin typeface="Meiryo" charset="-128"/>
-                <a:ea typeface="Meiryo" charset="-128"/>
-                <a:cs typeface="Meiryo" charset="-128"/>
-              </a:rPr>
-              <a:t>の誕</a:t>
-            </a:r>
-            <a:r>
-              <a:rPr lang="zh-CN" altLang="en-US" dirty="0" smtClean="0">
-                <a:latin typeface="Meiryo" charset="-128"/>
-                <a:ea typeface="Meiryo" charset="-128"/>
-                <a:cs typeface="Meiryo" charset="-128"/>
-              </a:rPr>
-              <a:t>生日と</a:t>
-            </a:r>
-            <a:r>
-              <a:rPr lang="ja-JP" altLang="en-US" dirty="0" smtClean="0">
-                <a:latin typeface="Meiryo" charset="-128"/>
-                <a:ea typeface="Meiryo" charset="-128"/>
-                <a:cs typeface="Meiryo" charset="-128"/>
-              </a:rPr>
-              <a:t>、神はそう</a:t>
-            </a:r>
-            <a:r>
-              <a:rPr lang="zh-CN" altLang="en-US" dirty="0" smtClean="0">
-                <a:latin typeface="Meiryo" charset="-128"/>
-                <a:ea typeface="Meiryo" charset="-128"/>
-                <a:cs typeface="Meiryo" charset="-128"/>
-              </a:rPr>
-              <a:t>告げ</a:t>
-            </a:r>
-            <a:r>
-              <a:rPr lang="ja-JP" altLang="en-US" dirty="0" smtClean="0">
-                <a:latin typeface="Meiryo" charset="-128"/>
-                <a:ea typeface="Meiryo" charset="-128"/>
-                <a:cs typeface="Meiryo" charset="-128"/>
-              </a:rPr>
-              <a:t>た。</a:t>
-            </a:r>
-            <a:endParaRPr kumimoji="1" lang="zh-CN" altLang="en-US" dirty="0">
-              <a:latin typeface="+mn-ea"/>
-            </a:endParaRPr>
+              <a:rPr kumimoji="1" lang="ja-JP" altLang="en-US" dirty="0" smtClean="0"/>
+              <a:t>みんなと話します。</a:t>
+            </a:r>
+            <a:endParaRPr kumimoji="1" lang="en-US" altLang="ja-JP" dirty="0" smtClean="0"/>
+          </a:p>
+          <a:p>
+            <a:r>
+              <a:rPr kumimoji="1" lang="ja-JP" altLang="en-US" dirty="0" smtClean="0"/>
+              <a:t>兄様なんかもう要りません、わたくしはこの男と結婚したいです。</a:t>
+            </a:r>
+            <a:endParaRPr kumimoji="1" lang="en-US" altLang="ja-JP" dirty="0" smtClean="0"/>
+          </a:p>
+          <a:p>
+            <a:r>
+              <a:rPr kumimoji="1" lang="ja-JP" altLang="en-US" dirty="0" smtClean="0"/>
+              <a:t>この男と結婚しないと、明日絶対死んでしまいます。既に死にましたけど。</a:t>
+            </a:r>
+            <a:endParaRPr kumimoji="1" lang="en-US" altLang="ja-JP" dirty="0" smtClean="0"/>
+          </a:p>
+          <a:p>
+            <a:endParaRPr kumimoji="1" lang="zh-CN" altLang="en-US" dirty="0"/>
           </a:p>
         </p:txBody>
       </p:sp>
     </p:spTree>
     <p:extLst>
       <p:ext uri="{BB962C8B-B14F-4D97-AF65-F5344CB8AC3E}">
-        <p14:creationId xmlns:p14="http://schemas.microsoft.com/office/powerpoint/2010/main" val="515948279"/>
+        <p14:creationId xmlns:p14="http://schemas.microsoft.com/office/powerpoint/2010/main" val="492151810"/>
       </p:ext>
     </p:extLst>
   </p:cSld>
@@ -8201,19 +8118,19 @@
           <a:lstStyle/>
           <a:p>
             <a:r>
-              <a:rPr kumimoji="1" lang="ja-JP" altLang="en-US" dirty="0" smtClean="0"/>
-              <a:t>へ</a:t>
-            </a:r>
-            <a:r>
-              <a:rPr kumimoji="1" lang="en-US" altLang="ja-JP" dirty="0" smtClean="0"/>
+              <a:rPr kumimoji="1" lang="ja-JP" altLang="en-US" dirty="0"/>
+              <a:t>と</a:t>
+            </a:r>
+            <a:r>
+              <a:rPr kumimoji="1" lang="en-US" altLang="ja-JP" dirty="0"/>
               <a:t/>
             </a:r>
             <a:br>
-              <a:rPr kumimoji="1" lang="en-US" altLang="ja-JP" dirty="0" smtClean="0"/>
+              <a:rPr kumimoji="1" lang="en-US" altLang="ja-JP" dirty="0"/>
             </a:br>
             <a:r>
               <a:rPr kumimoji="1" lang="zh-CN" altLang="en-US" dirty="0" smtClean="0"/>
-              <a:t>表示方位上的目的</a:t>
+              <a:t>表示引用</a:t>
             </a:r>
             <a:endParaRPr kumimoji="1" lang="zh-CN" altLang="en-US" dirty="0"/>
           </a:p>
@@ -8235,24 +8152,115 @@
           <a:lstStyle/>
           <a:p>
             <a:r>
-              <a:rPr kumimoji="1" lang="ja-JP" altLang="en-US" dirty="0" smtClean="0"/>
-              <a:t>ネットカフェへ行きます。</a:t>
-            </a:r>
-            <a:endParaRPr kumimoji="1" lang="en-US" altLang="ja-JP" dirty="0" smtClean="0"/>
-          </a:p>
-          <a:p>
-            <a:r>
-              <a:rPr kumimoji="1" lang="ja-JP" altLang="en-US" dirty="0" smtClean="0"/>
-              <a:t>一刻も早く情熱なラブレターを書いて、サンクトペテルブルグさんのお家へ届きました。</a:t>
-            </a:r>
-            <a:endParaRPr kumimoji="1" lang="zh-CN" altLang="en-US" dirty="0"/>
+              <a:rPr kumimoji="1" lang="ja-JP" altLang="en-US" dirty="0" smtClean="0">
+                <a:latin typeface="+mn-ea"/>
+              </a:rPr>
+              <a:t>これはいいと思います。</a:t>
+            </a:r>
+            <a:endParaRPr kumimoji="1" lang="en-US" altLang="ja-JP" dirty="0" smtClean="0">
+              <a:latin typeface="+mn-ea"/>
+            </a:endParaRPr>
+          </a:p>
+          <a:p>
+            <a:r>
+              <a:rPr kumimoji="1" lang="ja-JP" altLang="en-US" dirty="0" smtClean="0">
+                <a:latin typeface="+mn-ea"/>
+              </a:rPr>
+              <a:t>いくらこのアクルカを被ったって、ハクはオシュトルになれないと、クオンはそう</a:t>
+            </a:r>
+            <a:r>
+              <a:rPr kumimoji="1" lang="ja-JP" altLang="en-US" smtClean="0">
+                <a:latin typeface="+mn-ea"/>
+              </a:rPr>
+              <a:t>思っているのだろう。</a:t>
+            </a:r>
+            <a:endParaRPr kumimoji="1" lang="en-US" altLang="ja-JP" dirty="0" smtClean="0">
+              <a:latin typeface="+mn-ea"/>
+            </a:endParaRPr>
+          </a:p>
+          <a:p>
+            <a:r>
+              <a:rPr lang="ja-JP" altLang="en-US" dirty="0" smtClean="0">
+                <a:latin typeface="Meiryo" charset="-128"/>
+                <a:ea typeface="Meiryo" charset="-128"/>
+                <a:cs typeface="Meiryo" charset="-128"/>
+              </a:rPr>
+              <a:t>これは</a:t>
+            </a:r>
+            <a:r>
+              <a:rPr lang="en-US" altLang="zh-CN" dirty="0" smtClean="0">
+                <a:latin typeface="Meiryo" charset="-128"/>
+                <a:ea typeface="Meiryo" charset="-128"/>
+                <a:cs typeface="Meiryo" charset="-128"/>
+              </a:rPr>
+              <a:t>『</a:t>
+            </a:r>
+            <a:r>
+              <a:rPr lang="zh-CN" altLang="en-US" dirty="0">
+                <a:latin typeface="Meiryo" charset="-128"/>
+                <a:ea typeface="Meiryo" charset="-128"/>
+                <a:cs typeface="Meiryo" charset="-128"/>
+              </a:rPr>
+              <a:t>世界最後</a:t>
+            </a:r>
+            <a:r>
+              <a:rPr lang="en-US" altLang="zh-CN" dirty="0">
+                <a:latin typeface="Meiryo" charset="-128"/>
+                <a:ea typeface="Meiryo" charset="-128"/>
+                <a:cs typeface="Meiryo" charset="-128"/>
+              </a:rPr>
+              <a:t>』</a:t>
+            </a:r>
+            <a:r>
+              <a:rPr lang="zh-CN" altLang="en-US" dirty="0">
+                <a:latin typeface="Meiryo" charset="-128"/>
+                <a:ea typeface="Meiryo" charset="-128"/>
+                <a:cs typeface="Meiryo" charset="-128"/>
+              </a:rPr>
+              <a:t>の誕</a:t>
+            </a:r>
+            <a:r>
+              <a:rPr lang="zh-CN" altLang="en-US" dirty="0" smtClean="0">
+                <a:latin typeface="Meiryo" charset="-128"/>
+                <a:ea typeface="Meiryo" charset="-128"/>
+                <a:cs typeface="Meiryo" charset="-128"/>
+              </a:rPr>
+              <a:t>生日と</a:t>
+            </a:r>
+            <a:r>
+              <a:rPr lang="ja-JP" altLang="en-US" dirty="0" smtClean="0">
+                <a:latin typeface="Meiryo" charset="-128"/>
+                <a:ea typeface="Meiryo" charset="-128"/>
+                <a:cs typeface="Meiryo" charset="-128"/>
+              </a:rPr>
+              <a:t>、神はそう</a:t>
+            </a:r>
+            <a:r>
+              <a:rPr lang="zh-CN" altLang="en-US" dirty="0" smtClean="0">
+                <a:latin typeface="Meiryo" charset="-128"/>
+                <a:ea typeface="Meiryo" charset="-128"/>
+                <a:cs typeface="Meiryo" charset="-128"/>
+              </a:rPr>
+              <a:t>告げ</a:t>
+            </a:r>
+            <a:r>
+              <a:rPr lang="ja-JP" altLang="en-US" dirty="0" smtClean="0">
+                <a:latin typeface="Meiryo" charset="-128"/>
+                <a:ea typeface="Meiryo" charset="-128"/>
+                <a:cs typeface="Meiryo" charset="-128"/>
+              </a:rPr>
+              <a:t>た。</a:t>
+            </a:r>
+            <a:endParaRPr kumimoji="1" lang="zh-CN" altLang="en-US" dirty="0">
+              <a:latin typeface="+mn-ea"/>
+            </a:endParaRPr>
           </a:p>
         </p:txBody>
       </p:sp>
     </p:spTree>
     <p:extLst>
       <p:ext uri="{BB962C8B-B14F-4D97-AF65-F5344CB8AC3E}">
-        <p14:creationId xmlns:p14="http://schemas.microsoft.com/office/powerpoint/2010/main" val="1699599996"/>
+        <p14:creationId xmlns:p14="http://schemas.microsoft.com/office/powerpoint/2010/main" val="515948279"/>
       </p:ext>
     </p:extLst>
   </p:cSld>
@@ -8296,7 +8304,7 @@
           <a:p>
             <a:r>
               <a:rPr kumimoji="1" lang="ja-JP" altLang="en-US" dirty="0" smtClean="0"/>
-              <a:t>から</a:t>
+              <a:t>へ</a:t>
             </a:r>
             <a:r>
               <a:rPr kumimoji="1" lang="en-US" altLang="ja-JP" dirty="0" smtClean="0"/>
@@ -8307,7 +8315,7 @@
             </a:br>
             <a:r>
               <a:rPr kumimoji="1" lang="zh-CN" altLang="en-US" dirty="0" smtClean="0"/>
-              <a:t>表示起始位置（范围）</a:t>
+              <a:t>表示方位上的目的</a:t>
             </a:r>
             <a:endParaRPr kumimoji="1" lang="zh-CN" altLang="en-US" dirty="0"/>
           </a:p>
@@ -8330,28 +8338,14 @@
           <a:p>
             <a:r>
               <a:rPr kumimoji="1" lang="ja-JP" altLang="en-US" dirty="0" smtClean="0"/>
-              <a:t>東京から来ました。</a:t>
+              <a:t>ネットカフェへ行きます。</a:t>
             </a:r>
             <a:endParaRPr kumimoji="1" lang="en-US" altLang="ja-JP" dirty="0" smtClean="0"/>
           </a:p>
           <a:p>
             <a:r>
               <a:rPr kumimoji="1" lang="ja-JP" altLang="en-US" dirty="0" smtClean="0"/>
-              <a:t>サンクトペテルブルグさんからの返信もすごく早いでした。</a:t>
-            </a:r>
-            <a:endParaRPr kumimoji="1" lang="en-US" altLang="ja-JP" dirty="0" smtClean="0"/>
-          </a:p>
-          <a:p>
-            <a:r>
-              <a:rPr kumimoji="1" lang="ja-JP" altLang="en-US" dirty="0" smtClean="0"/>
-              <a:t>デートも誘われました。わたくしは胸がときめいてたまらなくて、こんな気持ち死んでから初めてなのです。</a:t>
-            </a:r>
-            <a:endParaRPr kumimoji="1" lang="en-US" altLang="ja-JP" dirty="0" smtClean="0"/>
-          </a:p>
-          <a:p>
-            <a:r>
-              <a:rPr kumimoji="1" lang="ja-JP" altLang="en-US" dirty="0" smtClean="0"/>
-              <a:t>でも一緒に観に行く映画はスリラーなのでちょっと怖いです。わたくしは幽霊が苦手ですから。</a:t>
+              <a:t>一刻も早く情熱なラブレターを書いて、サンクトペテルブルグさんのお家へ届きました。</a:t>
             </a:r>
             <a:endParaRPr kumimoji="1" lang="zh-CN" altLang="en-US" dirty="0"/>
           </a:p>
@@ -8360,7 +8354,7 @@
     </p:spTree>
     <p:extLst>
       <p:ext uri="{BB962C8B-B14F-4D97-AF65-F5344CB8AC3E}">
-        <p14:creationId xmlns:p14="http://schemas.microsoft.com/office/powerpoint/2010/main" val="431856380"/>
+        <p14:creationId xmlns:p14="http://schemas.microsoft.com/office/powerpoint/2010/main" val="1699599996"/>
       </p:ext>
     </p:extLst>
   </p:cSld>
@@ -8404,7 +8398,7 @@
           <a:p>
             <a:r>
               <a:rPr kumimoji="1" lang="ja-JP" altLang="en-US" dirty="0" smtClean="0"/>
-              <a:t>より</a:t>
+              <a:t>から</a:t>
             </a:r>
             <a:r>
               <a:rPr kumimoji="1" lang="en-US" altLang="ja-JP" dirty="0" smtClean="0"/>
@@ -8415,7 +8409,7 @@
             </a:br>
             <a:r>
               <a:rPr kumimoji="1" lang="zh-CN" altLang="en-US" dirty="0" smtClean="0"/>
-              <a:t>表示比较</a:t>
+              <a:t>表示起始位置（范围）</a:t>
             </a:r>
             <a:endParaRPr kumimoji="1" lang="zh-CN" altLang="en-US" dirty="0"/>
           </a:p>
@@ -8438,30 +8432,37 @@
           <a:p>
             <a:r>
               <a:rPr kumimoji="1" lang="ja-JP" altLang="en-US" dirty="0" smtClean="0"/>
-              <a:t>彼より背が高いです。</a:t>
+              <a:t>東京から来ました。</a:t>
             </a:r>
             <a:endParaRPr kumimoji="1" lang="en-US" altLang="ja-JP" dirty="0" smtClean="0"/>
           </a:p>
           <a:p>
             <a:r>
               <a:rPr kumimoji="1" lang="ja-JP" altLang="en-US" dirty="0" smtClean="0"/>
-              <a:t>サンクトペテルブルグさんに年齢を聞きました。わたくしより年上なんて驚きました。</a:t>
+              <a:t>サンクトペテルブルグさんからの返信もすごく早いでした。</a:t>
             </a:r>
             <a:endParaRPr kumimoji="1" lang="en-US" altLang="ja-JP" dirty="0" smtClean="0"/>
           </a:p>
           <a:p>
             <a:r>
               <a:rPr kumimoji="1" lang="ja-JP" altLang="en-US" dirty="0" smtClean="0"/>
-              <a:t>結局彼はわたくしの兄様と分かりました。二百年ぶりの再会ですから、顔や名前ぐらい誰でも覚えられないではないか。なんにせよ、兄様とまた会えるなんて何より嬉しいことです。</a:t>
+              <a:t>デートも誘われました。わたくしは胸がときめいてたまらなくて、こんな気持ち死んでから初めてなのです。</a:t>
             </a:r>
             <a:endParaRPr kumimoji="1" lang="en-US" altLang="ja-JP" dirty="0" smtClean="0"/>
+          </a:p>
+          <a:p>
+            <a:r>
+              <a:rPr kumimoji="1" lang="ja-JP" altLang="en-US" dirty="0" smtClean="0"/>
+              <a:t>でも一緒に観に行く映画はスリラーなのでちょっと怖いです。わたくしは幽霊が苦手ですから。</a:t>
+            </a:r>
+            <a:endParaRPr kumimoji="1" lang="zh-CN" altLang="en-US" dirty="0"/>
           </a:p>
         </p:txBody>
       </p:sp>
     </p:spTree>
     <p:extLst>
       <p:ext uri="{BB962C8B-B14F-4D97-AF65-F5344CB8AC3E}">
-        <p14:creationId xmlns:p14="http://schemas.microsoft.com/office/powerpoint/2010/main" val="595998118"/>
+        <p14:creationId xmlns:p14="http://schemas.microsoft.com/office/powerpoint/2010/main" val="431856380"/>
       </p:ext>
     </p:extLst>
   </p:cSld>
@@ -8516,79 +8517,53 @@
             </a:br>
             <a:r>
               <a:rPr kumimoji="1" lang="zh-CN" altLang="en-US" dirty="0" smtClean="0"/>
-              <a:t>表示</a:t>
-            </a:r>
-            <a:r>
-              <a:rPr kumimoji="1" lang="zh-CN" altLang="en-US" dirty="0" smtClean="0"/>
-              <a:t>来历，经由（类似于</a:t>
-            </a:r>
+              <a:t>表示比较</a:t>
+            </a:r>
+            <a:endParaRPr kumimoji="1" lang="zh-CN" altLang="en-US" dirty="0"/>
+          </a:p>
+        </p:txBody>
+      </p:sp>
+      <p:sp>
+        <p:nvSpPr>
+          <p:cNvPr id="3" name="内容占位符 2"/>
+          <p:cNvSpPr>
+            <a:spLocks noGrp="1"/>
+          </p:cNvSpPr>
+          <p:nvPr>
+            <p:ph idx="1"/>
+          </p:nvPr>
+        </p:nvSpPr>
+        <p:spPr/>
+        <p:txBody>
+          <a:bodyPr/>
+          <a:lstStyle/>
+          <a:p>
             <a:r>
               <a:rPr kumimoji="1" lang="ja-JP" altLang="en-US" dirty="0" smtClean="0"/>
-              <a:t>から</a:t>
-            </a:r>
-            <a:r>
-              <a:rPr kumimoji="1" lang="zh-CN" altLang="en-US" dirty="0" smtClean="0"/>
-              <a:t>）</a:t>
-            </a:r>
-            <a:endParaRPr kumimoji="1" lang="zh-CN" altLang="en-US" dirty="0"/>
-          </a:p>
-        </p:txBody>
-      </p:sp>
-      <p:sp>
-        <p:nvSpPr>
-          <p:cNvPr id="3" name="内容占位符 2"/>
-          <p:cNvSpPr>
-            <a:spLocks noGrp="1"/>
-          </p:cNvSpPr>
-          <p:nvPr>
-            <p:ph idx="1"/>
-          </p:nvPr>
-        </p:nvSpPr>
-        <p:spPr/>
-        <p:txBody>
-          <a:bodyPr/>
-          <a:lstStyle/>
+              <a:t>彼より背が高いです。</a:t>
+            </a:r>
+            <a:endParaRPr kumimoji="1" lang="en-US" altLang="ja-JP" dirty="0" smtClean="0"/>
+          </a:p>
           <a:p>
             <a:r>
               <a:rPr kumimoji="1" lang="ja-JP" altLang="en-US" dirty="0" smtClean="0"/>
-              <a:t>帝国から来た正体不明の黒（白？）髪の青年</a:t>
-            </a:r>
-            <a:r>
-              <a:rPr kumimoji="1" lang="ja-JP" altLang="en-US" dirty="0"/>
-              <a:t>が起こした、クロスベル地下</a:t>
-            </a:r>
+              <a:t>サンクトペテルブルグさんに年齢を聞きました。わたくしより年上なんて驚きました。</a:t>
+            </a:r>
+            <a:endParaRPr kumimoji="1" lang="en-US" altLang="ja-JP" dirty="0" smtClean="0"/>
+          </a:p>
+          <a:p>
             <a:r>
               <a:rPr kumimoji="1" lang="ja-JP" altLang="en-US" dirty="0" smtClean="0"/>
-              <a:t>水路経由の奇襲は、ロイド</a:t>
-            </a:r>
-            <a:r>
-              <a:rPr kumimoji="1" lang="ja-JP" altLang="en-US" dirty="0"/>
-              <a:t>・</a:t>
-            </a:r>
-            <a:r>
-              <a:rPr kumimoji="1" lang="ja-JP" altLang="en-US" dirty="0" smtClean="0"/>
-              <a:t>バニングス</a:t>
-            </a:r>
-            <a:r>
-              <a:rPr lang="ja-JP" altLang="en-US" dirty="0"/>
-              <a:t>捜査</a:t>
-            </a:r>
-            <a:r>
-              <a:rPr lang="ja-JP" altLang="en-US" dirty="0" smtClean="0"/>
-              <a:t>官</a:t>
-            </a:r>
-            <a:r>
-              <a:rPr kumimoji="1" lang="ja-JP" altLang="en-US" dirty="0" smtClean="0"/>
-              <a:t>とリーシャ・マオの臨時戦闘小隊により見事に撃破した。クロスベル新聞社より。</a:t>
-            </a:r>
-            <a:endParaRPr kumimoji="1" lang="ja-JP" altLang="en-US" dirty="0"/>
+              <a:t>結局彼はわたくしの兄様と分かりました。二百年ぶりの再会ですから、顔や名前ぐらい誰でも覚えられないではないか。なんにせよ、兄様とまた会えるなんて何より嬉しいことです。</a:t>
+            </a:r>
+            <a:endParaRPr kumimoji="1" lang="en-US" altLang="ja-JP" dirty="0" smtClean="0"/>
           </a:p>
         </p:txBody>
       </p:sp>
     </p:spTree>
     <p:extLst>
       <p:ext uri="{BB962C8B-B14F-4D97-AF65-F5344CB8AC3E}">
-        <p14:creationId xmlns:p14="http://schemas.microsoft.com/office/powerpoint/2010/main" val="685639377"/>
+        <p14:creationId xmlns:p14="http://schemas.microsoft.com/office/powerpoint/2010/main" val="595998118"/>
       </p:ext>
     </p:extLst>
   </p:cSld>
@@ -8632,7 +8607,7 @@
           <a:p>
             <a:r>
               <a:rPr kumimoji="1" lang="ja-JP" altLang="en-US" dirty="0" smtClean="0"/>
-              <a:t>まで</a:t>
+              <a:t>より</a:t>
             </a:r>
             <a:r>
               <a:rPr kumimoji="1" lang="en-US" altLang="ja-JP" dirty="0" smtClean="0"/>
@@ -8643,7 +8618,15 @@
             </a:br>
             <a:r>
               <a:rPr kumimoji="1" lang="zh-CN" altLang="en-US" dirty="0" smtClean="0"/>
-              <a:t>表示目的，终止位置（范围）</a:t>
+              <a:t>表示来历，经由（类似于</a:t>
+            </a:r>
+            <a:r>
+              <a:rPr kumimoji="1" lang="ja-JP" altLang="en-US" dirty="0" smtClean="0"/>
+              <a:t>から</a:t>
+            </a:r>
+            <a:r>
+              <a:rPr kumimoji="1" lang="zh-CN" altLang="en-US" dirty="0" smtClean="0"/>
+              <a:t>）</a:t>
             </a:r>
             <a:endParaRPr kumimoji="1" lang="zh-CN" altLang="en-US" dirty="0"/>
           </a:p>
@@ -8665,97 +8648,45 @@
           <a:lstStyle/>
           <a:p>
             <a:r>
-              <a:rPr kumimoji="1" lang="ja-JP" altLang="en-US" dirty="0" smtClean="0">
-                <a:latin typeface="Meiryo" charset="-128"/>
-                <a:ea typeface="Meiryo" charset="-128"/>
-                <a:cs typeface="Meiryo" charset="-128"/>
-              </a:rPr>
-              <a:t>この電車は夜</a:t>
-            </a:r>
-            <a:r>
-              <a:rPr kumimoji="1" lang="en-US" altLang="ja-JP" dirty="0" smtClean="0">
-                <a:latin typeface="Meiryo" charset="-128"/>
-                <a:ea typeface="Meiryo" charset="-128"/>
-                <a:cs typeface="Meiryo" charset="-128"/>
-              </a:rPr>
-              <a:t>9</a:t>
-            </a:r>
-            <a:r>
-              <a:rPr kumimoji="1" lang="ja-JP" altLang="en-US" dirty="0" smtClean="0">
-                <a:latin typeface="Meiryo" charset="-128"/>
-                <a:ea typeface="Meiryo" charset="-128"/>
-                <a:cs typeface="Meiryo" charset="-128"/>
-              </a:rPr>
-              <a:t>時まで運営します。</a:t>
-            </a:r>
-            <a:endParaRPr kumimoji="1" lang="en-US" altLang="ja-JP" dirty="0" smtClean="0">
-              <a:latin typeface="Meiryo" charset="-128"/>
-              <a:ea typeface="Meiryo" charset="-128"/>
-              <a:cs typeface="Meiryo" charset="-128"/>
-            </a:endParaRPr>
-          </a:p>
-          <a:p>
-            <a:r>
-              <a:rPr kumimoji="1" lang="ja-JP" altLang="en-US" dirty="0" smtClean="0">
-                <a:latin typeface="Meiryo" charset="-128"/>
-                <a:ea typeface="Meiryo" charset="-128"/>
-                <a:cs typeface="Meiryo" charset="-128"/>
-              </a:rPr>
-              <a:t>あの女の子は空まで行って</a:t>
-            </a:r>
-            <a:r>
-              <a:rPr kumimoji="1" lang="ja-JP" altLang="en-US" smtClean="0">
-                <a:latin typeface="Meiryo" charset="-128"/>
-                <a:ea typeface="Meiryo" charset="-128"/>
-                <a:cs typeface="Meiryo" charset="-128"/>
-              </a:rPr>
-              <a:t>みたいと言っています。</a:t>
-            </a:r>
-            <a:endParaRPr kumimoji="1" lang="en-US" altLang="ja-JP" dirty="0" smtClean="0">
-              <a:latin typeface="Meiryo" charset="-128"/>
-              <a:ea typeface="Meiryo" charset="-128"/>
-              <a:cs typeface="Meiryo" charset="-128"/>
-            </a:endParaRPr>
-          </a:p>
-          <a:p>
-            <a:r>
-              <a:rPr kumimoji="1" lang="ja-JP" altLang="en-US" dirty="0" smtClean="0">
-                <a:latin typeface="Meiryo" charset="-128"/>
-                <a:ea typeface="Meiryo" charset="-128"/>
-                <a:cs typeface="Meiryo" charset="-128"/>
-              </a:rPr>
-              <a:t>よくぞここまでたどり着いたな、相棒！</a:t>
-            </a:r>
-            <a:endParaRPr kumimoji="1" lang="en-US" altLang="zh-CN" dirty="0" smtClean="0">
-              <a:latin typeface="Meiryo" charset="-128"/>
-              <a:ea typeface="Meiryo" charset="-128"/>
-              <a:cs typeface="Meiryo" charset="-128"/>
-            </a:endParaRPr>
-          </a:p>
-          <a:p>
-            <a:r>
-              <a:rPr kumimoji="1" lang="zh-CN" altLang="en-US" dirty="0" smtClean="0">
-                <a:latin typeface="Meiryo" charset="-128"/>
-                <a:ea typeface="Meiryo" charset="-128"/>
-                <a:cs typeface="Meiryo" charset="-128"/>
-              </a:rPr>
-              <a:t>お</a:t>
-            </a:r>
-            <a:r>
-              <a:rPr kumimoji="1" lang="zh-CN" altLang="en-US" dirty="0">
-                <a:latin typeface="Meiryo" charset="-128"/>
-                <a:ea typeface="Meiryo" charset="-128"/>
-                <a:cs typeface="Meiryo" charset="-128"/>
-              </a:rPr>
-              <a:t>前は今まで食ったパンの枚数を覚えているのか？</a:t>
-            </a:r>
+              <a:rPr kumimoji="1" lang="ja-JP" altLang="en-US" dirty="0" smtClean="0"/>
+              <a:t>帝国から来た正体不明の黒（白？）髪の青年</a:t>
+            </a:r>
+            <a:r>
+              <a:rPr kumimoji="1" lang="ja-JP" altLang="en-US" dirty="0"/>
+              <a:t>が起こした、クロスベル地下</a:t>
+            </a:r>
+            <a:r>
+              <a:rPr kumimoji="1" lang="ja-JP" altLang="en-US" dirty="0" smtClean="0"/>
+              <a:t>水路経由の奇襲は、ロイド</a:t>
+            </a:r>
+            <a:r>
+              <a:rPr kumimoji="1" lang="ja-JP" altLang="en-US" dirty="0"/>
+              <a:t>・</a:t>
+            </a:r>
+            <a:r>
+              <a:rPr kumimoji="1" lang="ja-JP" altLang="en-US" dirty="0" smtClean="0"/>
+              <a:t>バニングス</a:t>
+            </a:r>
+            <a:r>
+              <a:rPr lang="ja-JP" altLang="en-US" dirty="0"/>
+              <a:t>捜査</a:t>
+            </a:r>
+            <a:r>
+              <a:rPr lang="ja-JP" altLang="en-US" dirty="0" smtClean="0"/>
+              <a:t>官</a:t>
+            </a:r>
+            <a:r>
+              <a:rPr kumimoji="1" lang="ja-JP" altLang="en-US" dirty="0" smtClean="0"/>
+              <a:t>とリーシャ・マオの臨時戦闘小隊により見事に撃破した。クロスベル新聞社より。</a:t>
+            </a:r>
+            <a:endParaRPr kumimoji="1" lang="ja-JP" altLang="en-US" dirty="0"/>
           </a:p>
         </p:txBody>
       </p:sp>
     </p:spTree>
     <p:extLst>
       <p:ext uri="{BB962C8B-B14F-4D97-AF65-F5344CB8AC3E}">
-        <p14:creationId xmlns:p14="http://schemas.microsoft.com/office/powerpoint/2010/main" val="1089704594"/>
+        <p14:creationId xmlns:p14="http://schemas.microsoft.com/office/powerpoint/2010/main" val="685639377"/>
       </p:ext>
     </p:extLst>
   </p:cSld>
@@ -8799,7 +8730,18 @@
           <a:p>
             <a:r>
               <a:rPr kumimoji="1" lang="ja-JP" altLang="en-US" dirty="0" smtClean="0"/>
-              <a:t>もっと複雑な？</a:t>
+              <a:t>まで</a:t>
+            </a:r>
+            <a:r>
+              <a:rPr kumimoji="1" lang="en-US" altLang="ja-JP" dirty="0" smtClean="0"/>
+              <a:t/>
+            </a:r>
+            <a:br>
+              <a:rPr kumimoji="1" lang="en-US" altLang="ja-JP" dirty="0" smtClean="0"/>
+            </a:br>
+            <a:r>
+              <a:rPr kumimoji="1" lang="zh-CN" altLang="en-US" dirty="0" smtClean="0"/>
+              <a:t>表示目的，终止位置（范围）</a:t>
             </a:r>
             <a:endParaRPr kumimoji="1" lang="zh-CN" altLang="en-US" dirty="0"/>
           </a:p>
@@ -8821,31 +8763,97 @@
           <a:lstStyle/>
           <a:p>
             <a:r>
-              <a:rPr kumimoji="1" lang="ja-JP" altLang="en-US" dirty="0" smtClean="0"/>
-              <a:t>には</a:t>
-            </a:r>
-            <a:endParaRPr kumimoji="1" lang="en-US" altLang="ja-JP" dirty="0" smtClean="0"/>
-          </a:p>
-          <a:p>
-            <a:r>
-              <a:rPr kumimoji="1" lang="ja-JP" altLang="en-US" dirty="0" smtClean="0"/>
-              <a:t>では</a:t>
-            </a:r>
-            <a:endParaRPr kumimoji="1" lang="en-US" altLang="ja-JP" dirty="0" smtClean="0"/>
-          </a:p>
-          <a:p>
-            <a:r>
-              <a:rPr kumimoji="1" lang="ja-JP" altLang="en-US" dirty="0" smtClean="0"/>
-              <a:t>。。。</a:t>
-            </a:r>
-            <a:endParaRPr kumimoji="1" lang="zh-CN" altLang="en-US" dirty="0"/>
+              <a:rPr kumimoji="1" lang="ja-JP" altLang="en-US" dirty="0" smtClean="0">
+                <a:latin typeface="Meiryo" charset="-128"/>
+                <a:ea typeface="Meiryo" charset="-128"/>
+                <a:cs typeface="Meiryo" charset="-128"/>
+              </a:rPr>
+              <a:t>この電車は夜</a:t>
+            </a:r>
+            <a:r>
+              <a:rPr kumimoji="1" lang="en-US" altLang="ja-JP" dirty="0" smtClean="0">
+                <a:latin typeface="Meiryo" charset="-128"/>
+                <a:ea typeface="Meiryo" charset="-128"/>
+                <a:cs typeface="Meiryo" charset="-128"/>
+              </a:rPr>
+              <a:t>9</a:t>
+            </a:r>
+            <a:r>
+              <a:rPr kumimoji="1" lang="ja-JP" altLang="en-US" dirty="0" smtClean="0">
+                <a:latin typeface="Meiryo" charset="-128"/>
+                <a:ea typeface="Meiryo" charset="-128"/>
+                <a:cs typeface="Meiryo" charset="-128"/>
+              </a:rPr>
+              <a:t>時まで運営します。</a:t>
+            </a:r>
+            <a:endParaRPr kumimoji="1" lang="en-US" altLang="ja-JP" dirty="0" smtClean="0">
+              <a:latin typeface="Meiryo" charset="-128"/>
+              <a:ea typeface="Meiryo" charset="-128"/>
+              <a:cs typeface="Meiryo" charset="-128"/>
+            </a:endParaRPr>
+          </a:p>
+          <a:p>
+            <a:r>
+              <a:rPr kumimoji="1" lang="ja-JP" altLang="en-US" dirty="0" smtClean="0">
+                <a:latin typeface="Meiryo" charset="-128"/>
+                <a:ea typeface="Meiryo" charset="-128"/>
+                <a:cs typeface="Meiryo" charset="-128"/>
+              </a:rPr>
+              <a:t>あの女の子は空まで行って</a:t>
+            </a:r>
+            <a:r>
+              <a:rPr kumimoji="1" lang="ja-JP" altLang="en-US" smtClean="0">
+                <a:latin typeface="Meiryo" charset="-128"/>
+                <a:ea typeface="Meiryo" charset="-128"/>
+                <a:cs typeface="Meiryo" charset="-128"/>
+              </a:rPr>
+              <a:t>みたいと言っています。</a:t>
+            </a:r>
+            <a:endParaRPr kumimoji="1" lang="en-US" altLang="ja-JP" dirty="0" smtClean="0">
+              <a:latin typeface="Meiryo" charset="-128"/>
+              <a:ea typeface="Meiryo" charset="-128"/>
+              <a:cs typeface="Meiryo" charset="-128"/>
+            </a:endParaRPr>
+          </a:p>
+          <a:p>
+            <a:r>
+              <a:rPr kumimoji="1" lang="ja-JP" altLang="en-US" dirty="0" smtClean="0">
+                <a:latin typeface="Meiryo" charset="-128"/>
+                <a:ea typeface="Meiryo" charset="-128"/>
+                <a:cs typeface="Meiryo" charset="-128"/>
+              </a:rPr>
+              <a:t>よくぞここまでたどり着いたな、相棒！</a:t>
+            </a:r>
+            <a:endParaRPr kumimoji="1" lang="en-US" altLang="zh-CN" dirty="0" smtClean="0">
+              <a:latin typeface="Meiryo" charset="-128"/>
+              <a:ea typeface="Meiryo" charset="-128"/>
+              <a:cs typeface="Meiryo" charset="-128"/>
+            </a:endParaRPr>
+          </a:p>
+          <a:p>
+            <a:r>
+              <a:rPr kumimoji="1" lang="zh-CN" altLang="en-US" dirty="0" smtClean="0">
+                <a:latin typeface="Meiryo" charset="-128"/>
+                <a:ea typeface="Meiryo" charset="-128"/>
+                <a:cs typeface="Meiryo" charset="-128"/>
+              </a:rPr>
+              <a:t>お</a:t>
+            </a:r>
+            <a:r>
+              <a:rPr kumimoji="1" lang="zh-CN" altLang="en-US" dirty="0">
+                <a:latin typeface="Meiryo" charset="-128"/>
+                <a:ea typeface="Meiryo" charset="-128"/>
+                <a:cs typeface="Meiryo" charset="-128"/>
+              </a:rPr>
+              <a:t>前は今まで食ったパンの枚数を覚えているのか？</a:t>
+            </a:r>
           </a:p>
         </p:txBody>
       </p:sp>
     </p:spTree>
     <p:extLst>
       <p:ext uri="{BB962C8B-B14F-4D97-AF65-F5344CB8AC3E}">
-        <p14:creationId xmlns:p14="http://schemas.microsoft.com/office/powerpoint/2010/main" val="445357208"/>
+        <p14:creationId xmlns:p14="http://schemas.microsoft.com/office/powerpoint/2010/main" val="1089704594"/>
       </p:ext>
     </p:extLst>
   </p:cSld>
@@ -8888,84 +8896,150 @@
           <a:lstStyle/>
           <a:p>
             <a:r>
+              <a:rPr kumimoji="1" lang="zh-CN" altLang="en-US" dirty="0" smtClean="0"/>
+              <a:t>友情提示</a:t>
+            </a:r>
+            <a:endParaRPr kumimoji="1" lang="zh-CN" altLang="en-US" dirty="0"/>
+          </a:p>
+        </p:txBody>
+      </p:sp>
+      <p:sp>
+        <p:nvSpPr>
+          <p:cNvPr id="3" name="内容占位符 2"/>
+          <p:cNvSpPr>
+            <a:spLocks noGrp="1"/>
+          </p:cNvSpPr>
+          <p:nvPr>
+            <p:ph idx="1"/>
+          </p:nvPr>
+        </p:nvSpPr>
+        <p:spPr/>
+        <p:txBody>
+          <a:bodyPr/>
+          <a:lstStyle/>
+          <a:p>
+            <a:r>
+              <a:rPr kumimoji="1" lang="zh-CN" altLang="en-US" dirty="0" smtClean="0"/>
+              <a:t>本次</a:t>
+            </a:r>
+            <a:r>
+              <a:rPr kumimoji="1" lang="en-US" altLang="zh-CN" dirty="0" err="1" smtClean="0"/>
+              <a:t>ppt</a:t>
+            </a:r>
+            <a:r>
+              <a:rPr kumimoji="1" lang="zh-CN" altLang="en-US" dirty="0" smtClean="0"/>
+              <a:t>课件中的例句得到了协会在岛大佬</a:t>
+            </a:r>
+            <a:r>
               <a:rPr kumimoji="1" lang="ja-JP" altLang="en-US" dirty="0" smtClean="0"/>
-              <a:t>は</a:t>
-            </a:r>
-            <a:r>
-              <a:rPr kumimoji="1" lang="en-US" altLang="ja-JP" dirty="0" smtClean="0"/>
-              <a:t/>
-            </a:r>
-            <a:br>
-              <a:rPr kumimoji="1" lang="en-US" altLang="ja-JP" dirty="0" smtClean="0"/>
-            </a:br>
+              <a:t>・</a:t>
+            </a:r>
             <a:r>
               <a:rPr kumimoji="1" lang="zh-CN" altLang="en-US" dirty="0" smtClean="0"/>
-              <a:t>指示主题</a:t>
-            </a:r>
-            <a:endParaRPr kumimoji="1" lang="zh-CN" altLang="en-US" dirty="0"/>
-          </a:p>
-        </p:txBody>
-      </p:sp>
-      <p:sp>
-        <p:nvSpPr>
-          <p:cNvPr id="3" name="内容占位符 2"/>
-          <p:cNvSpPr>
-            <a:spLocks noGrp="1"/>
-          </p:cNvSpPr>
-          <p:nvPr>
-            <p:ph idx="1"/>
-          </p:nvPr>
-        </p:nvSpPr>
-        <p:spPr/>
-        <p:txBody>
-          <a:bodyPr/>
-          <a:lstStyle/>
-          <a:p>
-            <a:r>
-              <a:rPr kumimoji="1" lang="ja-JP" altLang="en-US" dirty="0" smtClean="0"/>
-              <a:t>彼は</a:t>
-            </a:r>
-            <a:r>
-              <a:rPr kumimoji="1" lang="en-US" altLang="ja-JP" dirty="0" smtClean="0"/>
-              <a:t>24</a:t>
-            </a:r>
-            <a:r>
-              <a:rPr kumimoji="1" lang="ja-JP" altLang="en-US" dirty="0" smtClean="0"/>
-              <a:t>歳の学生です。</a:t>
-            </a:r>
-            <a:endParaRPr kumimoji="1" lang="en-US" altLang="ja-JP" dirty="0" smtClean="0"/>
-          </a:p>
-          <a:p>
-            <a:r>
-              <a:rPr kumimoji="1" lang="ja-JP" altLang="en-US" dirty="0" smtClean="0"/>
-              <a:t>私はよく眠られません。</a:t>
-            </a:r>
-            <a:endParaRPr kumimoji="1" lang="en-US" altLang="ja-JP" dirty="0" smtClean="0"/>
-          </a:p>
-          <a:p>
-            <a:r>
-              <a:rPr kumimoji="1" lang="ja-JP" altLang="en-US" dirty="0"/>
-              <a:t>わたくしは鶴子と申します</a:t>
-            </a:r>
-            <a:r>
-              <a:rPr kumimoji="1" lang="ja-JP" altLang="en-US" dirty="0" smtClean="0"/>
-              <a:t>。</a:t>
-            </a:r>
-            <a:endParaRPr kumimoji="1" lang="en-US" altLang="ja-JP" dirty="0" smtClean="0"/>
-          </a:p>
-          <a:p>
-            <a:r>
-              <a:rPr kumimoji="1" lang="ja-JP" altLang="en-US" dirty="0" smtClean="0"/>
-              <a:t>ここは知識の大釜があるところです。</a:t>
-            </a:r>
-            <a:endParaRPr kumimoji="1" lang="en-US" altLang="ja-JP" dirty="0" smtClean="0"/>
+              <a:t>刘总的大力支持。大家可以猜一下哪</a:t>
+            </a:r>
+            <a:r>
+              <a:rPr kumimoji="1" lang="zh-CN" altLang="en-US" smtClean="0"/>
+              <a:t>句话是谁弄上去的</a:t>
+            </a:r>
+            <a:endParaRPr kumimoji="1" lang="zh-CN" altLang="en-US"/>
           </a:p>
         </p:txBody>
       </p:sp>
     </p:spTree>
     <p:extLst>
       <p:ext uri="{BB962C8B-B14F-4D97-AF65-F5344CB8AC3E}">
-        <p14:creationId xmlns:p14="http://schemas.microsoft.com/office/powerpoint/2010/main" val="1149457654"/>
+        <p14:creationId xmlns:p14="http://schemas.microsoft.com/office/powerpoint/2010/main" val="686378795"/>
+      </p:ext>
+    </p:extLst>
+  </p:cSld>
+  <p:clrMapOvr>
+    <a:masterClrMapping/>
+  </p:clrMapOvr>
+</p:sld>
+</file>
+
+<file path=ppt/slides/slide20.xml><?xml version="1.0" encoding="utf-8"?>
+<p:sld xmlns:a="http://schemas.openxmlformats.org/drawingml/2006/main" xmlns:r="http://schemas.openxmlformats.org/officeDocument/2006/relationships" xmlns:p="http://schemas.openxmlformats.org/presentationml/2006/main">
+  <p:cSld>
+    <p:spTree>
+      <p:nvGrpSpPr>
+        <p:cNvPr id="1" name=""/>
+        <p:cNvGrpSpPr/>
+        <p:nvPr/>
+      </p:nvGrpSpPr>
+      <p:grpSpPr>
+        <a:xfrm>
+          <a:off x="0" y="0"/>
+          <a:ext cx="0" cy="0"/>
+          <a:chOff x="0" y="0"/>
+          <a:chExt cx="0" cy="0"/>
+        </a:xfrm>
+      </p:grpSpPr>
+      <p:sp>
+        <p:nvSpPr>
+          <p:cNvPr id="2" name="标题 1"/>
+          <p:cNvSpPr>
+            <a:spLocks noGrp="1"/>
+          </p:cNvSpPr>
+          <p:nvPr>
+            <p:ph type="title"/>
+          </p:nvPr>
+        </p:nvSpPr>
+        <p:spPr/>
+        <p:txBody>
+          <a:bodyPr/>
+          <a:lstStyle/>
+          <a:p>
+            <a:r>
+              <a:rPr kumimoji="1" lang="ja-JP" altLang="en-US" dirty="0" smtClean="0"/>
+              <a:t>もっと複雑な？</a:t>
+            </a:r>
+            <a:endParaRPr kumimoji="1" lang="zh-CN" altLang="en-US" dirty="0"/>
+          </a:p>
+        </p:txBody>
+      </p:sp>
+      <p:sp>
+        <p:nvSpPr>
+          <p:cNvPr id="3" name="内容占位符 2"/>
+          <p:cNvSpPr>
+            <a:spLocks noGrp="1"/>
+          </p:cNvSpPr>
+          <p:nvPr>
+            <p:ph idx="1"/>
+          </p:nvPr>
+        </p:nvSpPr>
+        <p:spPr/>
+        <p:txBody>
+          <a:bodyPr/>
+          <a:lstStyle/>
+          <a:p>
+            <a:r>
+              <a:rPr kumimoji="1" lang="ja-JP" altLang="en-US" dirty="0" smtClean="0"/>
+              <a:t>には</a:t>
+            </a:r>
+            <a:endParaRPr kumimoji="1" lang="en-US" altLang="ja-JP" dirty="0" smtClean="0"/>
+          </a:p>
+          <a:p>
+            <a:r>
+              <a:rPr kumimoji="1" lang="ja-JP" altLang="en-US" dirty="0" smtClean="0"/>
+              <a:t>では</a:t>
+            </a:r>
+            <a:endParaRPr kumimoji="1" lang="en-US" altLang="ja-JP" dirty="0" smtClean="0"/>
+          </a:p>
+          <a:p>
+            <a:r>
+              <a:rPr kumimoji="1" lang="ja-JP" altLang="en-US" dirty="0" smtClean="0"/>
+              <a:t>。。。</a:t>
+            </a:r>
+            <a:endParaRPr kumimoji="1" lang="zh-CN" altLang="en-US" dirty="0"/>
+          </a:p>
+        </p:txBody>
+      </p:sp>
+    </p:spTree>
+    <p:extLst>
+      <p:ext uri="{BB962C8B-B14F-4D97-AF65-F5344CB8AC3E}">
+        <p14:creationId xmlns:p14="http://schemas.microsoft.com/office/powerpoint/2010/main" val="445357208"/>
       </p:ext>
     </p:extLst>
   </p:cSld>
@@ -9009,7 +9083,7 @@
           <a:p>
             <a:r>
               <a:rPr kumimoji="1" lang="ja-JP" altLang="en-US" dirty="0" smtClean="0"/>
-              <a:t>が</a:t>
+              <a:t>は</a:t>
             </a:r>
             <a:r>
               <a:rPr kumimoji="1" lang="en-US" altLang="ja-JP" dirty="0" smtClean="0"/>
@@ -9020,7 +9094,7 @@
             </a:br>
             <a:r>
               <a:rPr kumimoji="1" lang="zh-CN" altLang="en-US" dirty="0" smtClean="0"/>
-              <a:t>指示主语</a:t>
+              <a:t>指示主题</a:t>
             </a:r>
             <a:endParaRPr kumimoji="1" lang="zh-CN" altLang="en-US" dirty="0"/>
           </a:p>
@@ -9043,44 +9117,49 @@
           <a:p>
             <a:r>
               <a:rPr kumimoji="1" lang="ja-JP" altLang="en-US" dirty="0" smtClean="0"/>
-              <a:t>私が転びました。</a:t>
+              <a:t>彼は</a:t>
+            </a:r>
+            <a:r>
+              <a:rPr kumimoji="1" lang="en-US" altLang="ja-JP" dirty="0" smtClean="0"/>
+              <a:t>24</a:t>
+            </a:r>
+            <a:r>
+              <a:rPr kumimoji="1" lang="ja-JP" altLang="en-US" dirty="0" smtClean="0"/>
+              <a:t>歳の学生です。</a:t>
             </a:r>
             <a:endParaRPr kumimoji="1" lang="en-US" altLang="ja-JP" dirty="0" smtClean="0"/>
           </a:p>
           <a:p>
             <a:r>
               <a:rPr kumimoji="1" lang="ja-JP" altLang="en-US" dirty="0" smtClean="0"/>
-              <a:t>彼が私の回答用紙から答えをコピーします。</a:t>
+              <a:t>私はよく眠られません。</a:t>
             </a:r>
             <a:endParaRPr kumimoji="1" lang="en-US" altLang="ja-JP" dirty="0" smtClean="0"/>
           </a:p>
           <a:p>
             <a:r>
+              <a:rPr kumimoji="1" lang="ja-JP" altLang="en-US" dirty="0"/>
+              <a:t>わたくしは鶴子と申します</a:t>
+            </a:r>
+            <a:r>
               <a:rPr kumimoji="1" lang="ja-JP" altLang="en-US" dirty="0" smtClean="0"/>
-              <a:t>この厄災ガノンから、誰がハイラルを守るのです。</a:t>
+              <a:t>。</a:t>
             </a:r>
             <a:endParaRPr kumimoji="1" lang="en-US" altLang="ja-JP" dirty="0" smtClean="0"/>
           </a:p>
           <a:p>
             <a:r>
               <a:rPr kumimoji="1" lang="ja-JP" altLang="en-US" dirty="0" smtClean="0"/>
-              <a:t>わたくしが探しているのは、うちの兄様です。</a:t>
+              <a:t>ここは知識の大釜があるところです。</a:t>
             </a:r>
             <a:endParaRPr kumimoji="1" lang="en-US" altLang="ja-JP" dirty="0" smtClean="0"/>
-          </a:p>
-          <a:p>
-            <a:r>
-              <a:rPr kumimoji="1" lang="ja-JP" altLang="en-US" dirty="0" smtClean="0"/>
-              <a:t>二百年前のその日、兄様は狩りに行ったが、まだ帰ってこないです。</a:t>
-            </a:r>
-            <a:endParaRPr kumimoji="1" lang="zh-CN" altLang="en-US" dirty="0"/>
           </a:p>
         </p:txBody>
       </p:sp>
     </p:spTree>
     <p:extLst>
       <p:ext uri="{BB962C8B-B14F-4D97-AF65-F5344CB8AC3E}">
-        <p14:creationId xmlns:p14="http://schemas.microsoft.com/office/powerpoint/2010/main" val="1812160654"/>
+        <p14:creationId xmlns:p14="http://schemas.microsoft.com/office/powerpoint/2010/main" val="1149457654"/>
       </p:ext>
     </p:extLst>
   </p:cSld>
@@ -9124,7 +9203,7 @@
           <a:p>
             <a:r>
               <a:rPr kumimoji="1" lang="ja-JP" altLang="en-US" dirty="0" smtClean="0"/>
-              <a:t>を</a:t>
+              <a:t>が</a:t>
             </a:r>
             <a:r>
               <a:rPr kumimoji="1" lang="en-US" altLang="ja-JP" dirty="0" smtClean="0"/>
@@ -9135,7 +9214,7 @@
             </a:br>
             <a:r>
               <a:rPr kumimoji="1" lang="zh-CN" altLang="en-US" dirty="0" smtClean="0"/>
-              <a:t>指示受动对象</a:t>
+              <a:t>指示主语</a:t>
             </a:r>
             <a:endParaRPr kumimoji="1" lang="zh-CN" altLang="en-US" dirty="0"/>
           </a:p>
@@ -9158,35 +9237,35 @@
           <a:p>
             <a:r>
               <a:rPr kumimoji="1" lang="ja-JP" altLang="en-US" dirty="0" smtClean="0"/>
-              <a:t>猫を撫でます。</a:t>
+              <a:t>私が転びました。</a:t>
             </a:r>
             <a:endParaRPr kumimoji="1" lang="en-US" altLang="ja-JP" dirty="0" smtClean="0"/>
           </a:p>
           <a:p>
             <a:r>
               <a:rPr kumimoji="1" lang="ja-JP" altLang="en-US" dirty="0" smtClean="0"/>
-              <a:t>コーヒーを飲みます。</a:t>
+              <a:t>彼が私の回答用紙から答えをコピーします。</a:t>
             </a:r>
             <a:endParaRPr kumimoji="1" lang="en-US" altLang="ja-JP" dirty="0" smtClean="0"/>
           </a:p>
           <a:p>
             <a:r>
               <a:rPr kumimoji="1" lang="ja-JP" altLang="en-US" dirty="0" smtClean="0"/>
-              <a:t>少し、頭を冷やそうか。</a:t>
+              <a:t>この厄災ガノンから、誰がハイラルを守るのです。</a:t>
             </a:r>
             <a:endParaRPr kumimoji="1" lang="en-US" altLang="ja-JP" dirty="0" smtClean="0"/>
           </a:p>
           <a:p>
             <a:r>
               <a:rPr kumimoji="1" lang="ja-JP" altLang="en-US" dirty="0" smtClean="0"/>
-              <a:t>今こそ、全知を掴む時。</a:t>
+              <a:t>わたくしが探しているのは、うちの兄様です。</a:t>
             </a:r>
             <a:endParaRPr kumimoji="1" lang="en-US" altLang="ja-JP" dirty="0" smtClean="0"/>
           </a:p>
           <a:p>
             <a:r>
               <a:rPr kumimoji="1" lang="ja-JP" altLang="en-US" dirty="0" smtClean="0"/>
-              <a:t>兄様がテレビを見たらすぐ家に帰ると願って、アイドルを始めました。</a:t>
+              <a:t>二百年前のその日、兄様は狩りに行ったが、まだ帰ってこないです。</a:t>
             </a:r>
             <a:endParaRPr kumimoji="1" lang="zh-CN" altLang="en-US" dirty="0"/>
           </a:p>
@@ -9195,7 +9274,7 @@
     </p:spTree>
     <p:extLst>
       <p:ext uri="{BB962C8B-B14F-4D97-AF65-F5344CB8AC3E}">
-        <p14:creationId xmlns:p14="http://schemas.microsoft.com/office/powerpoint/2010/main" val="909684422"/>
+        <p14:creationId xmlns:p14="http://schemas.microsoft.com/office/powerpoint/2010/main" val="1812160654"/>
       </p:ext>
     </p:extLst>
   </p:cSld>
@@ -9239,7 +9318,7 @@
           <a:p>
             <a:r>
               <a:rPr kumimoji="1" lang="ja-JP" altLang="en-US" dirty="0" smtClean="0"/>
-              <a:t>に</a:t>
+              <a:t>を</a:t>
             </a:r>
             <a:r>
               <a:rPr kumimoji="1" lang="en-US" altLang="ja-JP" dirty="0" smtClean="0"/>
@@ -9250,7 +9329,7 @@
             </a:br>
             <a:r>
               <a:rPr kumimoji="1" lang="zh-CN" altLang="en-US" dirty="0" smtClean="0"/>
-              <a:t>表示动词关联对象</a:t>
+              <a:t>指示受动对象</a:t>
             </a:r>
             <a:endParaRPr kumimoji="1" lang="zh-CN" altLang="en-US" dirty="0"/>
           </a:p>
@@ -9273,37 +9352,44 @@
           <a:p>
             <a:r>
               <a:rPr kumimoji="1" lang="ja-JP" altLang="en-US" dirty="0" smtClean="0"/>
-              <a:t>彼に見せます。</a:t>
+              <a:t>猫を撫でます。</a:t>
             </a:r>
             <a:endParaRPr kumimoji="1" lang="en-US" altLang="ja-JP" dirty="0" smtClean="0"/>
           </a:p>
           <a:p>
             <a:r>
               <a:rPr kumimoji="1" lang="ja-JP" altLang="en-US" dirty="0" smtClean="0"/>
-              <a:t>この大宇宙金平糖を、私にあげて。</a:t>
+              <a:t>コーヒーを飲みます。</a:t>
             </a:r>
             <a:endParaRPr kumimoji="1" lang="en-US" altLang="ja-JP" dirty="0" smtClean="0"/>
           </a:p>
           <a:p>
             <a:r>
               <a:rPr kumimoji="1" lang="ja-JP" altLang="en-US" dirty="0" smtClean="0"/>
-              <a:t>まさかあの魔神に乗っ取られたとは、なんという不覚。</a:t>
+              <a:t>少し、頭を冷やそうか。</a:t>
             </a:r>
             <a:endParaRPr kumimoji="1" lang="en-US" altLang="ja-JP" dirty="0" smtClean="0"/>
           </a:p>
           <a:p>
             <a:r>
               <a:rPr kumimoji="1" lang="ja-JP" altLang="en-US" dirty="0" smtClean="0"/>
-              <a:t>この格好が兄様に見られたらすごく恥ずかしいけど、仕事だから仕方がありませぬ。</a:t>
+              <a:t>今こそ、全知を掴む時。</a:t>
             </a:r>
             <a:endParaRPr kumimoji="1" lang="en-US" altLang="ja-JP" dirty="0" smtClean="0"/>
+          </a:p>
+          <a:p>
+            <a:r>
+              <a:rPr kumimoji="1" lang="ja-JP" altLang="en-US" dirty="0" smtClean="0"/>
+              <a:t>兄様がテレビを見たらすぐ家に帰ると願って、アイドルを始めました。</a:t>
+            </a:r>
+            <a:endParaRPr kumimoji="1" lang="zh-CN" altLang="en-US" dirty="0"/>
           </a:p>
         </p:txBody>
       </p:sp>
     </p:spTree>
     <p:extLst>
       <p:ext uri="{BB962C8B-B14F-4D97-AF65-F5344CB8AC3E}">
-        <p14:creationId xmlns:p14="http://schemas.microsoft.com/office/powerpoint/2010/main" val="130404949"/>
+        <p14:creationId xmlns:p14="http://schemas.microsoft.com/office/powerpoint/2010/main" val="909684422"/>
       </p:ext>
     </p:extLst>
   </p:cSld>
@@ -9358,7 +9444,7 @@
             </a:br>
             <a:r>
               <a:rPr kumimoji="1" lang="zh-CN" altLang="en-US" dirty="0" smtClean="0"/>
-              <a:t>指示具体时间（带数字的那种）</a:t>
+              <a:t>表示动词关联对象</a:t>
             </a:r>
             <a:endParaRPr kumimoji="1" lang="zh-CN" altLang="en-US" dirty="0"/>
           </a:p>
@@ -9381,45 +9467,37 @@
           <a:p>
             <a:r>
               <a:rPr kumimoji="1" lang="ja-JP" altLang="en-US" dirty="0" smtClean="0"/>
-              <a:t>午前</a:t>
-            </a:r>
-            <a:r>
-              <a:rPr kumimoji="1" lang="en-US" altLang="ja-JP" dirty="0" smtClean="0"/>
-              <a:t>10</a:t>
-            </a:r>
+              <a:t>彼に見せます。</a:t>
+            </a:r>
+            <a:endParaRPr kumimoji="1" lang="en-US" altLang="ja-JP" dirty="0" smtClean="0"/>
+          </a:p>
+          <a:p>
             <a:r>
               <a:rPr kumimoji="1" lang="ja-JP" altLang="en-US" dirty="0" smtClean="0"/>
-              <a:t>時半に学校へ向かいます。</a:t>
+              <a:t>この大宇宙金平糖を、私にあげて。</a:t>
             </a:r>
             <a:endParaRPr kumimoji="1" lang="en-US" altLang="ja-JP" dirty="0" smtClean="0"/>
           </a:p>
           <a:p>
             <a:r>
               <a:rPr kumimoji="1" lang="ja-JP" altLang="en-US" dirty="0" smtClean="0"/>
-              <a:t>毎日</a:t>
-            </a:r>
-            <a:r>
-              <a:rPr kumimoji="1" lang="en-US" altLang="ja-JP" dirty="0" smtClean="0"/>
-              <a:t>11</a:t>
-            </a:r>
+              <a:t>まさかあの魔神に乗っ取られたとは、なんという不覚。</a:t>
+            </a:r>
+            <a:endParaRPr kumimoji="1" lang="en-US" altLang="ja-JP" dirty="0" smtClean="0"/>
+          </a:p>
+          <a:p>
             <a:r>
               <a:rPr kumimoji="1" lang="ja-JP" altLang="en-US" dirty="0" smtClean="0"/>
-              <a:t>時半に起きなければならないのは流石に厳しいです。</a:t>
+              <a:t>この格好が兄様に見られたらすごく恥ずかしいけど、仕事だから仕方がありませぬ。</a:t>
             </a:r>
             <a:endParaRPr kumimoji="1" lang="en-US" altLang="ja-JP" dirty="0" smtClean="0"/>
-          </a:p>
-          <a:p>
-            <a:endParaRPr kumimoji="1" lang="en-US" altLang="ja-JP" dirty="0" smtClean="0"/>
-          </a:p>
-          <a:p>
-            <a:endParaRPr kumimoji="1" lang="zh-CN" altLang="en-US" dirty="0"/>
           </a:p>
         </p:txBody>
       </p:sp>
     </p:spTree>
     <p:extLst>
       <p:ext uri="{BB962C8B-B14F-4D97-AF65-F5344CB8AC3E}">
-        <p14:creationId xmlns:p14="http://schemas.microsoft.com/office/powerpoint/2010/main" val="217030382"/>
+        <p14:creationId xmlns:p14="http://schemas.microsoft.com/office/powerpoint/2010/main" val="130404949"/>
       </p:ext>
     </p:extLst>
   </p:cSld>
@@ -9463,7 +9541,7 @@
           <a:p>
             <a:r>
               <a:rPr kumimoji="1" lang="ja-JP" altLang="en-US" dirty="0" smtClean="0"/>
-              <a:t>で</a:t>
+              <a:t>に</a:t>
             </a:r>
             <a:r>
               <a:rPr kumimoji="1" lang="en-US" altLang="ja-JP" dirty="0" smtClean="0"/>
@@ -9474,7 +9552,7 @@
             </a:br>
             <a:r>
               <a:rPr kumimoji="1" lang="zh-CN" altLang="en-US" dirty="0" smtClean="0"/>
-              <a:t>表示范围</a:t>
+              <a:t>指示具体时间（带数字的那种）</a:t>
             </a:r>
             <a:endParaRPr kumimoji="1" lang="zh-CN" altLang="en-US" dirty="0"/>
           </a:p>
@@ -9497,53 +9575,45 @@
           <a:p>
             <a:r>
               <a:rPr kumimoji="1" lang="ja-JP" altLang="en-US" dirty="0" smtClean="0"/>
-              <a:t>公園でジョギングします。</a:t>
+              <a:t>午前</a:t>
+            </a:r>
+            <a:r>
+              <a:rPr kumimoji="1" lang="en-US" altLang="ja-JP" dirty="0" smtClean="0"/>
+              <a:t>10</a:t>
+            </a:r>
+            <a:r>
+              <a:rPr kumimoji="1" lang="ja-JP" altLang="en-US" dirty="0" smtClean="0"/>
+              <a:t>時半に学校へ向かいます。</a:t>
             </a:r>
             <a:endParaRPr kumimoji="1" lang="en-US" altLang="ja-JP" dirty="0" smtClean="0"/>
           </a:p>
           <a:p>
             <a:r>
               <a:rPr kumimoji="1" lang="ja-JP" altLang="en-US" dirty="0" smtClean="0"/>
-              <a:t>食堂でゴキブリを見ました。</a:t>
+              <a:t>毎日</a:t>
+            </a:r>
+            <a:r>
+              <a:rPr kumimoji="1" lang="en-US" altLang="ja-JP" dirty="0" smtClean="0"/>
+              <a:t>11</a:t>
+            </a:r>
+            <a:r>
+              <a:rPr kumimoji="1" lang="ja-JP" altLang="en-US" dirty="0" smtClean="0"/>
+              <a:t>時半に起きなければならないのは流石に厳しいです。</a:t>
             </a:r>
             <a:endParaRPr kumimoji="1" lang="en-US" altLang="ja-JP" dirty="0" smtClean="0"/>
           </a:p>
           <a:p>
-            <a:r>
-              <a:rPr kumimoji="1" lang="ja-JP" altLang="en-US" dirty="0" smtClean="0"/>
-              <a:t>昨夜の番組では、テレパシーでファン達に占ってあげました。</a:t>
-            </a:r>
             <a:endParaRPr kumimoji="1" lang="en-US" altLang="ja-JP" dirty="0" smtClean="0"/>
           </a:p>
           <a:p>
-            <a:r>
-              <a:rPr kumimoji="1" lang="zh-CN" altLang="en-US" dirty="0">
-                <a:latin typeface="Meiryo" charset="-128"/>
-                <a:ea typeface="Meiryo" charset="-128"/>
-                <a:cs typeface="Meiryo" charset="-128"/>
-              </a:rPr>
-              <a:t>トイレでの災難はポルナレフの役だ</a:t>
-            </a:r>
-            <a:r>
-              <a:rPr kumimoji="1" lang="zh-CN" altLang="en-US" dirty="0" smtClean="0">
-                <a:latin typeface="Meiryo" charset="-128"/>
-                <a:ea typeface="Meiryo" charset="-128"/>
-                <a:cs typeface="Meiryo" charset="-128"/>
-              </a:rPr>
-              <a:t>！</a:t>
-            </a:r>
-            <a:endParaRPr kumimoji="1" lang="en-US" altLang="ja-JP" dirty="0" smtClean="0">
-              <a:latin typeface="Meiryo" charset="-128"/>
-              <a:ea typeface="Meiryo" charset="-128"/>
-              <a:cs typeface="Meiryo" charset="-128"/>
-            </a:endParaRPr>
+            <a:endParaRPr kumimoji="1" lang="zh-CN" altLang="en-US" dirty="0"/>
           </a:p>
         </p:txBody>
       </p:sp>
     </p:spTree>
     <p:extLst>
       <p:ext uri="{BB962C8B-B14F-4D97-AF65-F5344CB8AC3E}">
-        <p14:creationId xmlns:p14="http://schemas.microsoft.com/office/powerpoint/2010/main" val="914454228"/>
+        <p14:creationId xmlns:p14="http://schemas.microsoft.com/office/powerpoint/2010/main" val="217030382"/>
       </p:ext>
     </p:extLst>
   </p:cSld>
@@ -9586,19 +9656,19 @@
           <a:lstStyle/>
           <a:p>
             <a:r>
-              <a:rPr kumimoji="1" lang="ja-JP" altLang="en-US" dirty="0"/>
+              <a:rPr kumimoji="1" lang="ja-JP" altLang="en-US" dirty="0" smtClean="0"/>
               <a:t>で</a:t>
             </a:r>
             <a:r>
-              <a:rPr kumimoji="1" lang="en-US" altLang="ja-JP" dirty="0"/>
+              <a:rPr kumimoji="1" lang="en-US" altLang="ja-JP" dirty="0" smtClean="0"/>
               <a:t/>
             </a:r>
             <a:br>
-              <a:rPr kumimoji="1" lang="en-US" altLang="ja-JP" dirty="0"/>
+              <a:rPr kumimoji="1" lang="en-US" altLang="ja-JP" dirty="0" smtClean="0"/>
             </a:br>
             <a:r>
               <a:rPr kumimoji="1" lang="zh-CN" altLang="en-US" dirty="0" smtClean="0"/>
-              <a:t>表示动作发生的媒介，手段，途径</a:t>
+              <a:t>表示范围</a:t>
             </a:r>
             <a:endParaRPr kumimoji="1" lang="zh-CN" altLang="en-US" dirty="0"/>
           </a:p>
@@ -9620,43 +9690,54 @@
           <a:lstStyle/>
           <a:p>
             <a:r>
-              <a:rPr lang="ja-JP" altLang="zh-CN" dirty="0" smtClean="0"/>
-              <a:t>クレジットカード</a:t>
-            </a:r>
-            <a:r>
-              <a:rPr lang="ja-JP" altLang="en-US" dirty="0" smtClean="0"/>
-              <a:t>で支払います。</a:t>
+              <a:rPr kumimoji="1" lang="ja-JP" altLang="en-US" dirty="0" smtClean="0"/>
+              <a:t>公園でジョギングします。</a:t>
             </a:r>
             <a:endParaRPr kumimoji="1" lang="en-US" altLang="ja-JP" dirty="0" smtClean="0"/>
           </a:p>
           <a:p>
             <a:r>
               <a:rPr kumimoji="1" lang="ja-JP" altLang="en-US" dirty="0" smtClean="0"/>
-              <a:t>市内バスで会社を通っています。</a:t>
+              <a:t>食堂でゴキブリを見ました。</a:t>
             </a:r>
             <a:endParaRPr kumimoji="1" lang="en-US" altLang="ja-JP" dirty="0" smtClean="0"/>
           </a:p>
           <a:p>
             <a:r>
               <a:rPr kumimoji="1" lang="ja-JP" altLang="en-US" dirty="0" smtClean="0"/>
-              <a:t>昨夜</a:t>
-            </a:r>
-            <a:r>
-              <a:rPr kumimoji="1" lang="ja-JP" altLang="en-US" dirty="0"/>
-              <a:t>の番組では、テレパシーでファン達に占ってあげました</a:t>
-            </a:r>
-            <a:r>
-              <a:rPr kumimoji="1" lang="ja-JP" altLang="en-US" dirty="0" smtClean="0"/>
-              <a:t>。</a:t>
-            </a:r>
-            <a:endParaRPr kumimoji="1" lang="en-US" altLang="ja-JP" dirty="0"/>
+              <a:t>昨夜の番組では、テレパシーでファン達に占ってあげました。</a:t>
+            </a:r>
+            <a:endParaRPr kumimoji="1" lang="en-US" altLang="ja-JP" dirty="0" smtClean="0"/>
+          </a:p>
+          <a:p>
+            <a:r>
+              <a:rPr kumimoji="1" lang="zh-CN" altLang="en-US" dirty="0">
+                <a:latin typeface="Meiryo" charset="-128"/>
+                <a:ea typeface="Meiryo" charset="-128"/>
+                <a:cs typeface="Meiryo" charset="-128"/>
+              </a:rPr>
+              <a:t>トイレでの災難はポルナレフの役だ</a:t>
+            </a:r>
+            <a:r>
+              <a:rPr kumimoji="1" lang="zh-CN" altLang="en-US" dirty="0" smtClean="0">
+                <a:latin typeface="Meiryo" charset="-128"/>
+                <a:ea typeface="Meiryo" charset="-128"/>
+                <a:cs typeface="Meiryo" charset="-128"/>
+              </a:rPr>
+              <a:t>！</a:t>
+            </a:r>
+            <a:endParaRPr kumimoji="1" lang="en-US" altLang="ja-JP" dirty="0" smtClean="0">
+              <a:latin typeface="Meiryo" charset="-128"/>
+              <a:ea typeface="Meiryo" charset="-128"/>
+              <a:cs typeface="Meiryo" charset="-128"/>
+            </a:endParaRPr>
           </a:p>
         </p:txBody>
       </p:sp>
     </p:spTree>
     <p:extLst>
       <p:ext uri="{BB962C8B-B14F-4D97-AF65-F5344CB8AC3E}">
-        <p14:creationId xmlns:p14="http://schemas.microsoft.com/office/powerpoint/2010/main" val="1019501926"/>
+        <p14:creationId xmlns:p14="http://schemas.microsoft.com/office/powerpoint/2010/main" val="914454228"/>
       </p:ext>
     </p:extLst>
   </p:cSld>
@@ -9699,65 +9780,77 @@
           <a:lstStyle/>
           <a:p>
             <a:r>
+              <a:rPr kumimoji="1" lang="ja-JP" altLang="en-US" dirty="0"/>
+              <a:t>で</a:t>
+            </a:r>
+            <a:r>
+              <a:rPr kumimoji="1" lang="en-US" altLang="ja-JP" dirty="0"/>
+              <a:t/>
+            </a:r>
+            <a:br>
+              <a:rPr kumimoji="1" lang="en-US" altLang="ja-JP" dirty="0"/>
+            </a:br>
+            <a:r>
+              <a:rPr kumimoji="1" lang="zh-CN" altLang="en-US" dirty="0" smtClean="0"/>
+              <a:t>表示动作发生的媒介，手段，途径</a:t>
+            </a:r>
+            <a:endParaRPr kumimoji="1" lang="zh-CN" altLang="en-US" dirty="0"/>
+          </a:p>
+        </p:txBody>
+      </p:sp>
+      <p:sp>
+        <p:nvSpPr>
+          <p:cNvPr id="3" name="内容占位符 2"/>
+          <p:cNvSpPr>
+            <a:spLocks noGrp="1"/>
+          </p:cNvSpPr>
+          <p:nvPr>
+            <p:ph idx="1"/>
+          </p:nvPr>
+        </p:nvSpPr>
+        <p:spPr/>
+        <p:txBody>
+          <a:bodyPr/>
+          <a:lstStyle/>
+          <a:p>
+            <a:r>
+              <a:rPr lang="ja-JP" altLang="zh-CN" dirty="0" smtClean="0"/>
+              <a:t>クレジットカード</a:t>
+            </a:r>
+            <a:r>
+              <a:rPr lang="ja-JP" altLang="en-US" dirty="0" smtClean="0"/>
+              <a:t>で支払います。</a:t>
+            </a:r>
+            <a:endParaRPr kumimoji="1" lang="en-US" altLang="ja-JP" dirty="0" smtClean="0"/>
+          </a:p>
+          <a:p>
+            <a:r>
               <a:rPr kumimoji="1" lang="ja-JP" altLang="en-US" dirty="0" smtClean="0"/>
-              <a:t>で</a:t>
-            </a:r>
-            <a:r>
-              <a:rPr kumimoji="1" lang="en-US" altLang="ja-JP" dirty="0" smtClean="0"/>
-              <a:t/>
-            </a:r>
-            <a:br>
-              <a:rPr kumimoji="1" lang="en-US" altLang="ja-JP" dirty="0" smtClean="0"/>
-            </a:br>
-            <a:r>
-              <a:rPr kumimoji="1" lang="zh-CN" altLang="en-US" dirty="0" smtClean="0"/>
-              <a:t>表示顺接（有时带因果关系）</a:t>
-            </a:r>
-            <a:endParaRPr kumimoji="1" lang="zh-CN" altLang="en-US" dirty="0"/>
-          </a:p>
-        </p:txBody>
-      </p:sp>
-      <p:sp>
-        <p:nvSpPr>
-          <p:cNvPr id="3" name="内容占位符 2"/>
-          <p:cNvSpPr>
-            <a:spLocks noGrp="1"/>
-          </p:cNvSpPr>
-          <p:nvPr>
-            <p:ph idx="1"/>
-          </p:nvPr>
-        </p:nvSpPr>
-        <p:spPr/>
-        <p:txBody>
-          <a:bodyPr/>
-          <a:lstStyle/>
+              <a:t>市内バスで会社を通っています。</a:t>
+            </a:r>
+            <a:endParaRPr kumimoji="1" lang="en-US" altLang="ja-JP" dirty="0" smtClean="0"/>
+          </a:p>
           <a:p>
             <a:r>
               <a:rPr kumimoji="1" lang="ja-JP" altLang="en-US" dirty="0" smtClean="0"/>
-              <a:t>スライムがヌルヌルでなんだかエロい気分です。</a:t>
+              <a:t>昨夜</a:t>
+            </a:r>
+            <a:r>
+              <a:rPr kumimoji="1" lang="ja-JP" altLang="en-US" dirty="0"/>
+              <a:t>の番組では、テレパシーでファン達に占ってあげました</a:t>
+            </a:r>
+            <a:r>
+              <a:rPr kumimoji="1" lang="ja-JP" altLang="en-US" dirty="0" smtClean="0"/>
+              <a:t>。</a:t>
             </a:r>
             <a:endParaRPr kumimoji="1" lang="en-US" altLang="ja-JP" dirty="0"/>
-          </a:p>
-          <a:p>
-            <a:r>
-              <a:rPr kumimoji="1" lang="ja-JP" altLang="en-US" dirty="0" smtClean="0"/>
-              <a:t>リンクは綺麗で、女装してもバレません。</a:t>
-            </a:r>
-            <a:endParaRPr kumimoji="1" lang="en-US" altLang="ja-JP" dirty="0" smtClean="0"/>
-          </a:p>
-          <a:p>
-            <a:r>
-              <a:rPr kumimoji="1" lang="ja-JP" altLang="en-US" dirty="0" smtClean="0"/>
-              <a:t>それで、あるイケメン男子に惚れました。</a:t>
-            </a:r>
-            <a:endParaRPr kumimoji="1" lang="zh-CN" altLang="en-US" dirty="0"/>
           </a:p>
         </p:txBody>
       </p:sp>
     </p:spTree>
     <p:extLst>
       <p:ext uri="{BB962C8B-B14F-4D97-AF65-F5344CB8AC3E}">
-        <p14:creationId xmlns:p14="http://schemas.microsoft.com/office/powerpoint/2010/main" val="22365501"/>
+        <p14:creationId xmlns:p14="http://schemas.microsoft.com/office/powerpoint/2010/main" val="1019501926"/>
       </p:ext>
     </p:extLst>
   </p:cSld>

</xml_diff>